<commit_message>
cleared up some language by seperating variables types versus referencing and added more examples
</commit_message>
<xml_diff>
--- a/JS-ValueAndReference.pptx
+++ b/JS-ValueAndReference.pptx
@@ -5,24 +5,27 @@
     <p:sldMasterId id="2147483659" r:id="rId1"/>
   </p:sldMasterIdLst>
   <p:notesMasterIdLst>
-    <p:notesMasterId r:id="rId17"/>
+    <p:notesMasterId r:id="rId20"/>
   </p:notesMasterIdLst>
   <p:sldIdLst>
     <p:sldId id="256" r:id="rId2"/>
     <p:sldId id="257" r:id="rId3"/>
     <p:sldId id="258" r:id="rId4"/>
     <p:sldId id="259" r:id="rId5"/>
-    <p:sldId id="260" r:id="rId6"/>
-    <p:sldId id="278" r:id="rId7"/>
-    <p:sldId id="279" r:id="rId8"/>
-    <p:sldId id="261" r:id="rId9"/>
-    <p:sldId id="272" r:id="rId10"/>
-    <p:sldId id="273" r:id="rId11"/>
-    <p:sldId id="274" r:id="rId12"/>
-    <p:sldId id="275" r:id="rId13"/>
-    <p:sldId id="276" r:id="rId14"/>
-    <p:sldId id="277" r:id="rId15"/>
-    <p:sldId id="271" r:id="rId16"/>
+    <p:sldId id="280" r:id="rId6"/>
+    <p:sldId id="260" r:id="rId7"/>
+    <p:sldId id="278" r:id="rId8"/>
+    <p:sldId id="279" r:id="rId9"/>
+    <p:sldId id="261" r:id="rId10"/>
+    <p:sldId id="272" r:id="rId11"/>
+    <p:sldId id="273" r:id="rId12"/>
+    <p:sldId id="274" r:id="rId13"/>
+    <p:sldId id="275" r:id="rId14"/>
+    <p:sldId id="276" r:id="rId15"/>
+    <p:sldId id="281" r:id="rId16"/>
+    <p:sldId id="282" r:id="rId17"/>
+    <p:sldId id="277" r:id="rId18"/>
+    <p:sldId id="271" r:id="rId19"/>
   </p:sldIdLst>
   <p:sldSz cx="9144000" cy="6858000" type="screen4x3"/>
   <p:notesSz cx="6858000" cy="9144000"/>
@@ -255,6 +258,11 @@
       </a:defRPr>
     </a:lvl9pPr>
   </p:defaultTextStyle>
+  <p:extLst>
+    <p:ext uri="{EFAFB233-063F-42B5-8137-9DF3F51BA10A}">
+      <p15:sldGuideLst xmlns:p15="http://schemas.microsoft.com/office/powerpoint/2012/main"/>
+    </p:ext>
+  </p:extLst>
 </p:presentation>
 </file>
 
@@ -1955,7 +1963,7 @@
           <a:p>
             <a:r>
               <a:rPr lang="en-US" dirty="0"/>
-              <a:t>Changing the nested details object values for the age attributes affects BOTH object, this is called a shallow copy, the primitive keys from o1 were copied to o2, the details key is a primitive value containing the reference to the nested object</a:t>
+              <a:t>The same spread operator works for arrays</a:t>
             </a:r>
           </a:p>
         </p:txBody>
@@ -2002,6 +2010,143 @@
                 <a:sym typeface="Calibri"/>
               </a:rPr>
               <a:t>12</a:t>
+            </a:fld>
+            <a:endParaRPr lang="en-US" sz="1200" b="0" i="0" u="none" strike="noStrike" cap="none">
+              <a:solidFill>
+                <a:schemeClr val="dk1"/>
+              </a:solidFill>
+              <a:latin typeface="Calibri"/>
+              <a:ea typeface="Calibri"/>
+              <a:cs typeface="Calibri"/>
+              <a:sym typeface="Calibri"/>
+            </a:endParaRPr>
+          </a:p>
+        </p:txBody>
+      </p:sp>
+    </p:spTree>
+    <p:extLst>
+      <p:ext uri="{BB962C8B-B14F-4D97-AF65-F5344CB8AC3E}">
+        <p14:creationId xmlns:p14="http://schemas.microsoft.com/office/powerpoint/2010/main" val="3994785921"/>
+      </p:ext>
+    </p:extLst>
+  </p:cSld>
+  <p:clrMapOvr>
+    <a:masterClrMapping/>
+  </p:clrMapOvr>
+</p:notes>
+</file>
+
+<file path=ppt/notesSlides/notesSlide11.xml><?xml version="1.0" encoding="utf-8"?>
+<p:notes xmlns:a="http://schemas.openxmlformats.org/drawingml/2006/main" xmlns:r="http://schemas.openxmlformats.org/officeDocument/2006/relationships" xmlns:p="http://schemas.openxmlformats.org/presentationml/2006/main">
+  <p:cSld>
+    <p:spTree>
+      <p:nvGrpSpPr>
+        <p:cNvPr id="1" name=""/>
+        <p:cNvGrpSpPr/>
+        <p:nvPr/>
+      </p:nvGrpSpPr>
+      <p:grpSpPr>
+        <a:xfrm>
+          <a:off x="0" y="0"/>
+          <a:ext cx="0" cy="0"/>
+          <a:chOff x="0" y="0"/>
+          <a:chExt cx="0" cy="0"/>
+        </a:xfrm>
+      </p:grpSpPr>
+      <p:sp>
+        <p:nvSpPr>
+          <p:cNvPr id="2" name="Slide Image Placeholder 1"/>
+          <p:cNvSpPr>
+            <a:spLocks noGrp="1" noRot="1" noChangeAspect="1"/>
+          </p:cNvSpPr>
+          <p:nvPr>
+            <p:ph type="sldImg"/>
+          </p:nvPr>
+        </p:nvSpPr>
+        <p:spPr/>
+      </p:sp>
+      <p:sp>
+        <p:nvSpPr>
+          <p:cNvPr id="3" name="Notes Placeholder 2"/>
+          <p:cNvSpPr>
+            <a:spLocks noGrp="1"/>
+          </p:cNvSpPr>
+          <p:nvPr>
+            <p:ph type="body" idx="1"/>
+          </p:nvPr>
+        </p:nvSpPr>
+        <p:spPr/>
+        <p:txBody>
+          <a:bodyPr/>
+          <a:lstStyle/>
+          <a:p>
+            <a:r>
+              <a:rPr lang="en-US" dirty="0"/>
+              <a:t>changing the nested details object values for the age attribute affects BOTH objects</a:t>
+            </a:r>
+          </a:p>
+          <a:p>
+            <a:r>
+              <a:rPr lang="en-US" dirty="0"/>
+              <a:t>this is called a shallow copy</a:t>
+            </a:r>
+          </a:p>
+          <a:p>
+            <a:r>
+              <a:rPr lang="en-US" dirty="0"/>
+              <a:t>the primitive keys from o1 were copied to o2</a:t>
+            </a:r>
+          </a:p>
+          <a:p>
+            <a:r>
+              <a:rPr lang="en-US" dirty="0"/>
+              <a:t>the details key is a primitive value containing the reference to the nested object</a:t>
+            </a:r>
+          </a:p>
+        </p:txBody>
+      </p:sp>
+      <p:sp>
+        <p:nvSpPr>
+          <p:cNvPr id="4" name="Slide Number Placeholder 3"/>
+          <p:cNvSpPr>
+            <a:spLocks noGrp="1"/>
+          </p:cNvSpPr>
+          <p:nvPr>
+            <p:ph type="sldNum" idx="12"/>
+          </p:nvPr>
+        </p:nvSpPr>
+        <p:spPr/>
+        <p:txBody>
+          <a:bodyPr/>
+          <a:lstStyle/>
+          <a:p>
+            <a:pPr marL="0" marR="0" lvl="0" indent="0" algn="r" rtl="0">
+              <a:lnSpc>
+                <a:spcPct val="100000"/>
+              </a:lnSpc>
+              <a:spcBef>
+                <a:spcPts val="0"/>
+              </a:spcBef>
+              <a:spcAft>
+                <a:spcPts val="0"/>
+              </a:spcAft>
+              <a:buClr>
+                <a:schemeClr val="dk1"/>
+              </a:buClr>
+              <a:buFont typeface="Calibri"/>
+              <a:buNone/>
+            </a:pPr>
+            <a:fld id="{00000000-1234-1234-1234-123412341234}" type="slidenum">
+              <a:rPr lang="en-US" sz="1200" b="0" i="0" u="none" strike="noStrike" cap="none" smtClean="0">
+                <a:solidFill>
+                  <a:schemeClr val="dk1"/>
+                </a:solidFill>
+                <a:latin typeface="Calibri"/>
+                <a:ea typeface="Calibri"/>
+                <a:cs typeface="Calibri"/>
+                <a:sym typeface="Calibri"/>
+              </a:rPr>
+              <a:t>13</a:t>
             </a:fld>
             <a:endParaRPr lang="en-US" sz="1200" b="0" i="0" u="none" strike="noStrike" cap="none">
               <a:solidFill>
@@ -2028,7 +2173,7 @@
 </p:notes>
 </file>
 
-<file path=ppt/notesSlides/notesSlide11.xml><?xml version="1.0" encoding="utf-8"?>
+<file path=ppt/notesSlides/notesSlide12.xml><?xml version="1.0" encoding="utf-8"?>
 <p:notes xmlns:a="http://schemas.openxmlformats.org/drawingml/2006/main" xmlns:r="http://schemas.openxmlformats.org/officeDocument/2006/relationships" xmlns:p="http://schemas.openxmlformats.org/presentationml/2006/main">
   <p:cSld>
     <p:spTree>
@@ -2092,7 +2237,23 @@
           <a:p>
             <a:r>
               <a:rPr lang="en-US" dirty="0"/>
-              <a:t>Changing the nested details object values for the age attributes affects BOTH object, this is called a shallow copy, the language and details keys from o1 were copied to o2, but the details key is a reference, not a value</a:t>
+              <a:t>changing the nested details object values for the age attribute affects only the specified objects</a:t>
+            </a:r>
+          </a:p>
+          <a:p>
+            <a:r>
+              <a:rPr lang="en-US" dirty="0"/>
+              <a:t>this is called a deep copy</a:t>
+            </a:r>
+          </a:p>
+          <a:p>
+            <a:r>
+              <a:rPr lang="en-US" dirty="0" err="1"/>
+              <a:t>structuredClone</a:t>
+            </a:r>
+            <a:r>
+              <a:rPr lang="en-US" dirty="0"/>
+              <a:t>() copies the values of nested types, not the reference</a:t>
             </a:r>
           </a:p>
         </p:txBody>
@@ -2144,7 +2305,7 @@
                 <a:cs typeface="Calibri"/>
                 <a:sym typeface="Calibri"/>
               </a:rPr>
-              <a:t>13</a:t>
+              <a:t>14</a:t>
             </a:fld>
             <a:endParaRPr lang="en-US" sz="1200" b="0" i="0" u="none" strike="noStrike" cap="none">
               <a:solidFill>
@@ -2171,7 +2332,7 @@
 </p:notes>
 </file>
 
-<file path=ppt/notesSlides/notesSlide12.xml><?xml version="1.0" encoding="utf-8"?>
+<file path=ppt/notesSlides/notesSlide13.xml><?xml version="1.0" encoding="utf-8"?>
 <p:notes xmlns:a="http://schemas.openxmlformats.org/drawingml/2006/main" xmlns:r="http://schemas.openxmlformats.org/officeDocument/2006/relationships" xmlns:p="http://schemas.openxmlformats.org/presentationml/2006/main" showMasterSp="0" showMasterPhAnim="0">
   <p:cSld>
     <p:spTree>
@@ -2307,7 +2468,7 @@
             </a:pPr>
             <a:fld id="{00000000-1234-1234-1234-123412341234}" type="slidenum">
               <a:rPr lang="en-US"/>
-              <a:t>15</a:t>
+              <a:t>18</a:t>
             </a:fld>
             <a:endParaRPr/>
           </a:p>
@@ -2854,10 +3015,7 @@
           </a:bodyPr>
           <a:lstStyle/>
           <a:p>
-            <a:pPr marL="0" marR="0" lvl="0" indent="0" algn="l" defTabSz="914400" rtl="0" eaLnBrk="1" fontAlgn="auto" latinLnBrk="0" hangingPunct="1">
-              <a:lnSpc>
-                <a:spcPct val="100000"/>
-              </a:lnSpc>
+            <a:pPr marL="0" lvl="0" indent="0" algn="l" rtl="0">
               <a:spcBef>
                 <a:spcPts val="440"/>
               </a:spcBef>
@@ -2870,33 +3028,11 @@
               <a:buSzPts val="1100"/>
               <a:buFont typeface="Arial"/>
               <a:buNone/>
-              <a:tabLst/>
-              <a:defRPr/>
             </a:pPr>
             <a:r>
-              <a:rPr lang="en-US" sz="2800" b="1" dirty="0"/>
-              <a:t>Important repeat</a:t>
+              <a:rPr lang="en-US" sz="1400" dirty="0"/>
+              <a:t>C++ is an example where objects are put in the heap but you manually have to remove the object after you are done using it</a:t>
             </a:r>
-            <a:r>
-              <a:rPr lang="en-US" sz="2800" dirty="0"/>
-              <a:t>: Creating a variable to a complex object stores the memory address in the heap of the complex object, not the object itself.</a:t>
-            </a:r>
-          </a:p>
-          <a:p>
-            <a:pPr marL="0" lvl="0" indent="0" algn="l" rtl="0">
-              <a:spcBef>
-                <a:spcPts val="440"/>
-              </a:spcBef>
-              <a:spcAft>
-                <a:spcPts val="0"/>
-              </a:spcAft>
-              <a:buClr>
-                <a:srgbClr val="000000"/>
-              </a:buClr>
-              <a:buSzPts val="1100"/>
-              <a:buFont typeface="Arial"/>
-              <a:buNone/>
-            </a:pPr>
             <a:endParaRPr sz="1400" dirty="0"/>
           </a:p>
         </p:txBody>
@@ -2941,7 +3077,7 @@
             </a:pPr>
             <a:fld id="{00000000-1234-1234-1234-123412341234}" type="slidenum">
               <a:rPr lang="en-US"/>
-              <a:t>5</a:t>
+              <a:t>6</a:t>
             </a:fld>
             <a:endParaRPr/>
           </a:p>
@@ -2956,6 +3092,148 @@
 </file>
 
 <file path=ppt/notesSlides/notesSlide6.xml><?xml version="1.0" encoding="utf-8"?>
+<p:notes xmlns:a="http://schemas.openxmlformats.org/drawingml/2006/main" xmlns:r="http://schemas.openxmlformats.org/officeDocument/2006/relationships" xmlns:p="http://schemas.openxmlformats.org/presentationml/2006/main">
+  <p:cSld>
+    <p:spTree>
+      <p:nvGrpSpPr>
+        <p:cNvPr id="1" name=""/>
+        <p:cNvGrpSpPr/>
+        <p:nvPr/>
+      </p:nvGrpSpPr>
+      <p:grpSpPr>
+        <a:xfrm>
+          <a:off x="0" y="0"/>
+          <a:ext cx="0" cy="0"/>
+          <a:chOff x="0" y="0"/>
+          <a:chExt cx="0" cy="0"/>
+        </a:xfrm>
+      </p:grpSpPr>
+      <p:sp>
+        <p:nvSpPr>
+          <p:cNvPr id="2" name="Slide Image Placeholder 1"/>
+          <p:cNvSpPr>
+            <a:spLocks noGrp="1" noRot="1" noChangeAspect="1"/>
+          </p:cNvSpPr>
+          <p:nvPr>
+            <p:ph type="sldImg"/>
+          </p:nvPr>
+        </p:nvSpPr>
+        <p:spPr/>
+      </p:sp>
+      <p:sp>
+        <p:nvSpPr>
+          <p:cNvPr id="3" name="Notes Placeholder 2"/>
+          <p:cNvSpPr>
+            <a:spLocks noGrp="1"/>
+          </p:cNvSpPr>
+          <p:nvPr>
+            <p:ph type="body" idx="1"/>
+          </p:nvPr>
+        </p:nvSpPr>
+        <p:spPr/>
+        <p:txBody>
+          <a:bodyPr/>
+          <a:lstStyle/>
+          <a:p>
+            <a:pPr marL="0" marR="0" lvl="0" indent="0" algn="l" defTabSz="914400" rtl="0" eaLnBrk="1" fontAlgn="auto" latinLnBrk="0" hangingPunct="1">
+              <a:lnSpc>
+                <a:spcPct val="100000"/>
+              </a:lnSpc>
+              <a:spcBef>
+                <a:spcPts val="440"/>
+              </a:spcBef>
+              <a:spcAft>
+                <a:spcPts val="0"/>
+              </a:spcAft>
+              <a:buClr>
+                <a:srgbClr val="000000"/>
+              </a:buClr>
+              <a:buSzPts val="1100"/>
+              <a:buFont typeface="Arial"/>
+              <a:buNone/>
+              <a:tabLst/>
+              <a:defRPr/>
+            </a:pPr>
+            <a:r>
+              <a:rPr lang="en-US" sz="1200" b="1" dirty="0"/>
+              <a:t>Important repeat</a:t>
+            </a:r>
+            <a:r>
+              <a:rPr lang="en-US" sz="1200" dirty="0"/>
+              <a:t>: Creating a variable to a complex type stores the memory address in the heap of the complex type, not the type itself.</a:t>
+            </a:r>
+          </a:p>
+        </p:txBody>
+      </p:sp>
+      <p:sp>
+        <p:nvSpPr>
+          <p:cNvPr id="4" name="Slide Number Placeholder 3"/>
+          <p:cNvSpPr>
+            <a:spLocks noGrp="1"/>
+          </p:cNvSpPr>
+          <p:nvPr>
+            <p:ph type="sldNum" idx="12"/>
+          </p:nvPr>
+        </p:nvSpPr>
+        <p:spPr/>
+        <p:txBody>
+          <a:bodyPr/>
+          <a:lstStyle/>
+          <a:p>
+            <a:pPr marL="0" marR="0" lvl="0" indent="0" algn="r" rtl="0">
+              <a:lnSpc>
+                <a:spcPct val="100000"/>
+              </a:lnSpc>
+              <a:spcBef>
+                <a:spcPts val="0"/>
+              </a:spcBef>
+              <a:spcAft>
+                <a:spcPts val="0"/>
+              </a:spcAft>
+              <a:buClr>
+                <a:schemeClr val="dk1"/>
+              </a:buClr>
+              <a:buFont typeface="Calibri"/>
+              <a:buNone/>
+            </a:pPr>
+            <a:fld id="{00000000-1234-1234-1234-123412341234}" type="slidenum">
+              <a:rPr lang="en-US" sz="1200" b="0" i="0" u="none" strike="noStrike" cap="none" smtClean="0">
+                <a:solidFill>
+                  <a:schemeClr val="dk1"/>
+                </a:solidFill>
+                <a:latin typeface="Calibri"/>
+                <a:ea typeface="Calibri"/>
+                <a:cs typeface="Calibri"/>
+                <a:sym typeface="Calibri"/>
+              </a:rPr>
+              <a:t>8</a:t>
+            </a:fld>
+            <a:endParaRPr lang="en-US" sz="1200" b="0" i="0" u="none" strike="noStrike" cap="none">
+              <a:solidFill>
+                <a:schemeClr val="dk1"/>
+              </a:solidFill>
+              <a:latin typeface="Calibri"/>
+              <a:ea typeface="Calibri"/>
+              <a:cs typeface="Calibri"/>
+              <a:sym typeface="Calibri"/>
+            </a:endParaRPr>
+          </a:p>
+        </p:txBody>
+      </p:sp>
+    </p:spTree>
+    <p:extLst>
+      <p:ext uri="{BB962C8B-B14F-4D97-AF65-F5344CB8AC3E}">
+        <p14:creationId xmlns:p14="http://schemas.microsoft.com/office/powerpoint/2010/main" val="3605463824"/>
+      </p:ext>
+    </p:extLst>
+  </p:cSld>
+  <p:clrMapOvr>
+    <a:masterClrMapping/>
+  </p:clrMapOvr>
+</p:notes>
+</file>
+
+<file path=ppt/notesSlides/notesSlide7.xml><?xml version="1.0" encoding="utf-8"?>
 <p:notes xmlns:a="http://schemas.openxmlformats.org/drawingml/2006/main" xmlns:r="http://schemas.openxmlformats.org/officeDocument/2006/relationships" xmlns:p="http://schemas.openxmlformats.org/presentationml/2006/main" showMasterSp="0" showMasterPhAnim="0">
   <p:cSld>
     <p:spTree>
@@ -3054,7 +3332,67 @@
             </a:pPr>
             <a:r>
               <a:rPr lang="en-US" sz="1400" dirty="0"/>
-              <a:t>Simple values cant be mutated on accident because they are passed around by the value, not by the address in memory. While you assigned the value of n to m and changed m, it does not change n</a:t>
+              <a:t>simple values cant be mutated on accident </a:t>
+            </a:r>
+          </a:p>
+          <a:p>
+            <a:pPr marL="0" lvl="0" indent="0" algn="l" rtl="0">
+              <a:spcBef>
+                <a:spcPts val="440"/>
+              </a:spcBef>
+              <a:spcAft>
+                <a:spcPts val="0"/>
+              </a:spcAft>
+              <a:buClr>
+                <a:srgbClr val="000000"/>
+              </a:buClr>
+              <a:buSzPts val="1100"/>
+              <a:buFont typeface="Arial"/>
+              <a:buNone/>
+            </a:pPr>
+            <a:r>
+              <a:rPr lang="en-US" sz="1400" dirty="0"/>
+              <a:t>they are passed around by the value</a:t>
+            </a:r>
+          </a:p>
+          <a:p>
+            <a:pPr marL="0" lvl="0" indent="0" algn="l" rtl="0">
+              <a:spcBef>
+                <a:spcPts val="440"/>
+              </a:spcBef>
+              <a:spcAft>
+                <a:spcPts val="0"/>
+              </a:spcAft>
+              <a:buClr>
+                <a:srgbClr val="000000"/>
+              </a:buClr>
+              <a:buSzPts val="1100"/>
+              <a:buFont typeface="Arial"/>
+              <a:buNone/>
+            </a:pPr>
+            <a:r>
+              <a:rPr lang="en-US" sz="1400" dirty="0"/>
+              <a:t>not by the address in memory</a:t>
+            </a:r>
+          </a:p>
+          <a:p>
+            <a:pPr marL="0" lvl="0" indent="0" algn="l" rtl="0">
+              <a:spcBef>
+                <a:spcPts val="440"/>
+              </a:spcBef>
+              <a:spcAft>
+                <a:spcPts val="0"/>
+              </a:spcAft>
+              <a:buClr>
+                <a:srgbClr val="000000"/>
+              </a:buClr>
+              <a:buSzPts val="1100"/>
+              <a:buFont typeface="Arial"/>
+              <a:buNone/>
+            </a:pPr>
+            <a:r>
+              <a:rPr lang="en-US" sz="1400" dirty="0"/>
+              <a:t>when the value of n is assigned to m and m is changed, it does not change n</a:t>
             </a:r>
             <a:endParaRPr sz="1400" dirty="0"/>
           </a:p>
@@ -3100,132 +3438,13 @@
             </a:pPr>
             <a:fld id="{00000000-1234-1234-1234-123412341234}" type="slidenum">
               <a:rPr lang="en-US"/>
-              <a:t>8</a:t>
+              <a:t>9</a:t>
             </a:fld>
             <a:endParaRPr/>
           </a:p>
         </p:txBody>
       </p:sp>
     </p:spTree>
-  </p:cSld>
-  <p:clrMapOvr>
-    <a:masterClrMapping/>
-  </p:clrMapOvr>
-</p:notes>
-</file>
-
-<file path=ppt/notesSlides/notesSlide7.xml><?xml version="1.0" encoding="utf-8"?>
-<p:notes xmlns:a="http://schemas.openxmlformats.org/drawingml/2006/main" xmlns:r="http://schemas.openxmlformats.org/officeDocument/2006/relationships" xmlns:p="http://schemas.openxmlformats.org/presentationml/2006/main">
-  <p:cSld>
-    <p:spTree>
-      <p:nvGrpSpPr>
-        <p:cNvPr id="1" name=""/>
-        <p:cNvGrpSpPr/>
-        <p:nvPr/>
-      </p:nvGrpSpPr>
-      <p:grpSpPr>
-        <a:xfrm>
-          <a:off x="0" y="0"/>
-          <a:ext cx="0" cy="0"/>
-          <a:chOff x="0" y="0"/>
-          <a:chExt cx="0" cy="0"/>
-        </a:xfrm>
-      </p:grpSpPr>
-      <p:sp>
-        <p:nvSpPr>
-          <p:cNvPr id="2" name="Slide Image Placeholder 1"/>
-          <p:cNvSpPr>
-            <a:spLocks noGrp="1" noRot="1" noChangeAspect="1"/>
-          </p:cNvSpPr>
-          <p:nvPr>
-            <p:ph type="sldImg"/>
-          </p:nvPr>
-        </p:nvSpPr>
-        <p:spPr/>
-      </p:sp>
-      <p:sp>
-        <p:nvSpPr>
-          <p:cNvPr id="3" name="Notes Placeholder 2"/>
-          <p:cNvSpPr>
-            <a:spLocks noGrp="1"/>
-          </p:cNvSpPr>
-          <p:nvPr>
-            <p:ph type="body" idx="1"/>
-          </p:nvPr>
-        </p:nvSpPr>
-        <p:spPr/>
-        <p:txBody>
-          <a:bodyPr/>
-          <a:lstStyle/>
-          <a:p>
-            <a:r>
-              <a:rPr lang="en-US" dirty="0"/>
-              <a:t>Because complex values are passed around by an address to the object, you will be changing the object. Changing o2 affects o1 because they both point to same location in memory</a:t>
-            </a:r>
-          </a:p>
-        </p:txBody>
-      </p:sp>
-      <p:sp>
-        <p:nvSpPr>
-          <p:cNvPr id="4" name="Slide Number Placeholder 3"/>
-          <p:cNvSpPr>
-            <a:spLocks noGrp="1"/>
-          </p:cNvSpPr>
-          <p:nvPr>
-            <p:ph type="sldNum" idx="12"/>
-          </p:nvPr>
-        </p:nvSpPr>
-        <p:spPr/>
-        <p:txBody>
-          <a:bodyPr/>
-          <a:lstStyle/>
-          <a:p>
-            <a:pPr marL="0" marR="0" lvl="0" indent="0" algn="r" rtl="0">
-              <a:lnSpc>
-                <a:spcPct val="100000"/>
-              </a:lnSpc>
-              <a:spcBef>
-                <a:spcPts val="0"/>
-              </a:spcBef>
-              <a:spcAft>
-                <a:spcPts val="0"/>
-              </a:spcAft>
-              <a:buClr>
-                <a:schemeClr val="dk1"/>
-              </a:buClr>
-              <a:buFont typeface="Calibri"/>
-              <a:buNone/>
-            </a:pPr>
-            <a:fld id="{00000000-1234-1234-1234-123412341234}" type="slidenum">
-              <a:rPr lang="en-US" sz="1200" b="0" i="0" u="none" strike="noStrike" cap="none" smtClean="0">
-                <a:solidFill>
-                  <a:schemeClr val="dk1"/>
-                </a:solidFill>
-                <a:latin typeface="Calibri"/>
-                <a:ea typeface="Calibri"/>
-                <a:cs typeface="Calibri"/>
-                <a:sym typeface="Calibri"/>
-              </a:rPr>
-              <a:t>9</a:t>
-            </a:fld>
-            <a:endParaRPr lang="en-US" sz="1200" b="0" i="0" u="none" strike="noStrike" cap="none">
-              <a:solidFill>
-                <a:schemeClr val="dk1"/>
-              </a:solidFill>
-              <a:latin typeface="Calibri"/>
-              <a:ea typeface="Calibri"/>
-              <a:cs typeface="Calibri"/>
-              <a:sym typeface="Calibri"/>
-            </a:endParaRPr>
-          </a:p>
-        </p:txBody>
-      </p:sp>
-    </p:spTree>
-    <p:extLst>
-      <p:ext uri="{BB962C8B-B14F-4D97-AF65-F5344CB8AC3E}">
-        <p14:creationId xmlns:p14="http://schemas.microsoft.com/office/powerpoint/2010/main" val="2919862229"/>
-      </p:ext>
-    </p:extLst>
   </p:cSld>
   <p:clrMapOvr>
     <a:masterClrMapping/>
@@ -3279,7 +3498,19 @@
           <a:p>
             <a:r>
               <a:rPr lang="en-US" dirty="0"/>
-              <a:t>How do we avoid unintended mutations? By understanding how making copies of complex variables works. Remember copying simple values copies the VALUE, copying complex values copies the ADDRESS to the object! </a:t>
+              <a:t>complex values are passed around by an address to the object</a:t>
+            </a:r>
+          </a:p>
+          <a:p>
+            <a:r>
+              <a:rPr lang="en-US" dirty="0"/>
+              <a:t>you will be changing the object</a:t>
+            </a:r>
+          </a:p>
+          <a:p>
+            <a:r>
+              <a:rPr lang="en-US" dirty="0"/>
+              <a:t>changing o2 affects o1 because they both point to same location in memory</a:t>
             </a:r>
           </a:p>
         </p:txBody>
@@ -3342,7 +3573,7 @@
     </p:spTree>
     <p:extLst>
       <p:ext uri="{BB962C8B-B14F-4D97-AF65-F5344CB8AC3E}">
-        <p14:creationId xmlns:p14="http://schemas.microsoft.com/office/powerpoint/2010/main" val="884994417"/>
+        <p14:creationId xmlns:p14="http://schemas.microsoft.com/office/powerpoint/2010/main" val="2919862229"/>
       </p:ext>
     </p:extLst>
   </p:cSld>
@@ -3398,8 +3629,17 @@
           <a:p>
             <a:r>
               <a:rPr lang="en-US" dirty="0"/>
-              <a:t>The same spread operator works for arrays</a:t>
+              <a:t>copying simple values copies the VALUE</a:t>
             </a:r>
+          </a:p>
+          <a:p>
+            <a:r>
+              <a:rPr lang="en-US" dirty="0"/>
+              <a:t>copying complex values copies the ADDRESS to the object</a:t>
+            </a:r>
+          </a:p>
+          <a:p>
+            <a:endParaRPr lang="en-US" dirty="0"/>
           </a:p>
         </p:txBody>
       </p:sp>
@@ -3461,7 +3701,7 @@
     </p:spTree>
     <p:extLst>
       <p:ext uri="{BB962C8B-B14F-4D97-AF65-F5344CB8AC3E}">
-        <p14:creationId xmlns:p14="http://schemas.microsoft.com/office/powerpoint/2010/main" val="3994785921"/>
+        <p14:creationId xmlns:p14="http://schemas.microsoft.com/office/powerpoint/2010/main" val="884994417"/>
       </p:ext>
     </p:extLst>
   </p:cSld>
@@ -20529,6 +20769,193 @@
           <p:cNvPr id="2" name="Title 1">
             <a:extLst>
               <a:ext uri="{FF2B5EF4-FFF2-40B4-BE49-F238E27FC236}">
+                <a16:creationId xmlns:a16="http://schemas.microsoft.com/office/drawing/2014/main" id="{0A4DCE4A-58C2-4130-C16B-67904DB39781}"/>
+              </a:ext>
+            </a:extLst>
+          </p:cNvPr>
+          <p:cNvSpPr>
+            <a:spLocks noGrp="1"/>
+          </p:cNvSpPr>
+          <p:nvPr>
+            <p:ph type="title"/>
+          </p:nvPr>
+        </p:nvSpPr>
+        <p:spPr/>
+        <p:txBody>
+          <a:bodyPr/>
+          <a:lstStyle/>
+          <a:p>
+            <a:r>
+              <a:rPr lang="en-US" dirty="0"/>
+              <a:t>Mutations of Complex Values</a:t>
+            </a:r>
+          </a:p>
+        </p:txBody>
+      </p:sp>
+      <p:sp>
+        <p:nvSpPr>
+          <p:cNvPr id="3" name="Text Placeholder 2">
+            <a:extLst>
+              <a:ext uri="{FF2B5EF4-FFF2-40B4-BE49-F238E27FC236}">
+                <a16:creationId xmlns:a16="http://schemas.microsoft.com/office/drawing/2014/main" id="{1C9F195E-E8D2-E258-5DE8-29E7D708BF9E}"/>
+              </a:ext>
+            </a:extLst>
+          </p:cNvPr>
+          <p:cNvSpPr>
+            <a:spLocks noGrp="1"/>
+          </p:cNvSpPr>
+          <p:nvPr>
+            <p:ph type="body" idx="1"/>
+          </p:nvPr>
+        </p:nvSpPr>
+        <p:spPr/>
+        <p:txBody>
+          <a:bodyPr/>
+          <a:lstStyle/>
+          <a:p>
+            <a:pPr marL="88900" indent="0">
+              <a:buNone/>
+            </a:pPr>
+            <a:r>
+              <a:rPr lang="en-US" dirty="0">
+                <a:latin typeface="Intel One Mono" panose="020B0509020203020204" pitchFamily="49" charset="0"/>
+              </a:rPr>
+              <a:t>let o1 = { language: “JavaScript" };</a:t>
+            </a:r>
+          </a:p>
+          <a:p>
+            <a:pPr marL="88900" indent="0">
+              <a:buNone/>
+            </a:pPr>
+            <a:r>
+              <a:rPr lang="en-US" dirty="0">
+                <a:latin typeface="Intel One Mono" panose="020B0509020203020204" pitchFamily="49" charset="0"/>
+              </a:rPr>
+              <a:t>let o2 = o1;</a:t>
+            </a:r>
+          </a:p>
+          <a:p>
+            <a:pPr marL="88900" indent="0">
+              <a:buNone/>
+            </a:pPr>
+            <a:r>
+              <a:rPr lang="en-US" dirty="0">
+                <a:latin typeface="Intel One Mono" panose="020B0509020203020204" pitchFamily="49" charset="0"/>
+              </a:rPr>
+              <a:t>o2.language = “</a:t>
+            </a:r>
+            <a:r>
+              <a:rPr lang="en-US" dirty="0" err="1">
+                <a:latin typeface="Intel One Mono" panose="020B0509020203020204" pitchFamily="49" charset="0"/>
+              </a:rPr>
+              <a:t>GoLang</a:t>
+            </a:r>
+            <a:r>
+              <a:rPr lang="en-US" dirty="0">
+                <a:latin typeface="Intel One Mono" panose="020B0509020203020204" pitchFamily="49" charset="0"/>
+              </a:rPr>
+              <a:t>";</a:t>
+            </a:r>
+          </a:p>
+          <a:p>
+            <a:pPr marL="88900" indent="0">
+              <a:buNone/>
+            </a:pPr>
+            <a:endParaRPr lang="en-US" dirty="0">
+              <a:latin typeface="Intel One Mono" panose="020B0509020203020204" pitchFamily="49" charset="0"/>
+            </a:endParaRPr>
+          </a:p>
+          <a:p>
+            <a:pPr marL="88900" indent="0">
+              <a:buNone/>
+            </a:pPr>
+            <a:r>
+              <a:rPr lang="en-US" dirty="0">
+                <a:latin typeface="Intel One Mono" panose="020B0509020203020204" pitchFamily="49" charset="0"/>
+              </a:rPr>
+              <a:t>console.log(o1.language); // "</a:t>
+            </a:r>
+            <a:r>
+              <a:rPr lang="en-US" dirty="0" err="1">
+                <a:latin typeface="Intel One Mono" panose="020B0509020203020204" pitchFamily="49" charset="0"/>
+              </a:rPr>
+              <a:t>GoLang</a:t>
+            </a:r>
+            <a:r>
+              <a:rPr lang="en-US" dirty="0">
+                <a:latin typeface="Intel One Mono" panose="020B0509020203020204" pitchFamily="49" charset="0"/>
+              </a:rPr>
+              <a:t>"</a:t>
+            </a:r>
+          </a:p>
+          <a:p>
+            <a:pPr marL="88900" indent="0">
+              <a:buNone/>
+            </a:pPr>
+            <a:r>
+              <a:rPr lang="en-US" dirty="0">
+                <a:latin typeface="Intel One Mono" panose="020B0509020203020204" pitchFamily="49" charset="0"/>
+              </a:rPr>
+              <a:t>console.log(o2.language); // "</a:t>
+            </a:r>
+            <a:r>
+              <a:rPr lang="en-US" dirty="0" err="1">
+                <a:latin typeface="Intel One Mono" panose="020B0509020203020204" pitchFamily="49" charset="0"/>
+              </a:rPr>
+              <a:t>GoLang</a:t>
+            </a:r>
+            <a:r>
+              <a:rPr lang="en-US" dirty="0">
+                <a:latin typeface="Intel One Mono" panose="020B0509020203020204" pitchFamily="49" charset="0"/>
+              </a:rPr>
+              <a:t>"</a:t>
+            </a:r>
+          </a:p>
+          <a:p>
+            <a:pPr marL="88900" indent="0">
+              <a:buNone/>
+            </a:pPr>
+            <a:endParaRPr lang="en-US" dirty="0">
+              <a:latin typeface="Intel One Mono" panose="020B0509020203020204" pitchFamily="49" charset="0"/>
+            </a:endParaRPr>
+          </a:p>
+        </p:txBody>
+      </p:sp>
+    </p:spTree>
+    <p:extLst>
+      <p:ext uri="{BB962C8B-B14F-4D97-AF65-F5344CB8AC3E}">
+        <p14:creationId xmlns:p14="http://schemas.microsoft.com/office/powerpoint/2010/main" val="4107396059"/>
+      </p:ext>
+    </p:extLst>
+  </p:cSld>
+  <p:clrMapOvr>
+    <a:masterClrMapping/>
+  </p:clrMapOvr>
+</p:sld>
+</file>
+
+<file path=ppt/slides/slide11.xml><?xml version="1.0" encoding="utf-8"?>
+<p:sld xmlns:a="http://schemas.openxmlformats.org/drawingml/2006/main" xmlns:r="http://schemas.openxmlformats.org/officeDocument/2006/relationships" xmlns:p="http://schemas.openxmlformats.org/presentationml/2006/main">
+  <p:cSld>
+    <p:spTree>
+      <p:nvGrpSpPr>
+        <p:cNvPr id="1" name=""/>
+        <p:cNvGrpSpPr/>
+        <p:nvPr/>
+      </p:nvGrpSpPr>
+      <p:grpSpPr>
+        <a:xfrm>
+          <a:off x="0" y="0"/>
+          <a:ext cx="0" cy="0"/>
+          <a:chOff x="0" y="0"/>
+          <a:chExt cx="0" cy="0"/>
+        </a:xfrm>
+      </p:grpSpPr>
+      <p:sp>
+        <p:nvSpPr>
+          <p:cNvPr id="2" name="Title 1">
+            <a:extLst>
+              <a:ext uri="{FF2B5EF4-FFF2-40B4-BE49-F238E27FC236}">
                 <a16:creationId xmlns:a16="http://schemas.microsoft.com/office/drawing/2014/main" id="{284358A7-0E48-EC26-7AFA-5CDD7BBCDE9B}"/>
               </a:ext>
             </a:extLst>
@@ -20591,7 +21018,7 @@
               <a:rPr lang="en-US" dirty="0">
                 <a:latin typeface="Intel One Mono" panose="020B0509020203020204" pitchFamily="49" charset="0"/>
               </a:rPr>
-              <a:t>let o2 = { ...o1 }; // Spread operator</a:t>
+              <a:t>let o2 = { ...o1 }; </a:t>
             </a:r>
           </a:p>
           <a:p>
@@ -20602,7 +21029,7 @@
               <a:rPr lang="en-US" dirty="0">
                 <a:latin typeface="Intel One Mono" panose="020B0509020203020204" pitchFamily="49" charset="0"/>
               </a:rPr>
-              <a:t>/* spread operator is equivalent to</a:t>
+              <a:t>/* … spread operator is equivalent to</a:t>
             </a:r>
           </a:p>
           <a:p>
@@ -20723,7 +21150,7 @@
 </p:sld>
 </file>
 
-<file path=ppt/slides/slide11.xml><?xml version="1.0" encoding="utf-8"?>
+<file path=ppt/slides/slide12.xml><?xml version="1.0" encoding="utf-8"?>
 <p:sld xmlns:a="http://schemas.openxmlformats.org/drawingml/2006/main" xmlns:r="http://schemas.openxmlformats.org/officeDocument/2006/relationships" xmlns:p="http://schemas.openxmlformats.org/presentationml/2006/main">
   <p:cSld>
     <p:spTree>
@@ -20882,7 +21309,7 @@
 </p:sld>
 </file>
 
-<file path=ppt/slides/slide12.xml><?xml version="1.0" encoding="utf-8"?>
+<file path=ppt/slides/slide13.xml><?xml version="1.0" encoding="utf-8"?>
 <p:sld xmlns:a="http://schemas.openxmlformats.org/drawingml/2006/main" xmlns:r="http://schemas.openxmlformats.org/officeDocument/2006/relationships" xmlns:p="http://schemas.openxmlformats.org/presentationml/2006/main">
   <p:cSld>
     <p:spTree>
@@ -21049,7 +21476,7 @@
               <a:rPr lang="en-US" dirty="0">
                 <a:latin typeface="Intel One Mono" panose="020B0509020203020204" pitchFamily="49" charset="0"/>
               </a:rPr>
-              <a:t>console.log(o1.details.age); // 50</a:t>
+              <a:t>console.log(o2.details.age); // 50</a:t>
             </a:r>
           </a:p>
           <a:p>
@@ -21075,7 +21502,7 @@
 </p:sld>
 </file>
 
-<file path=ppt/slides/slide13.xml><?xml version="1.0" encoding="utf-8"?>
+<file path=ppt/slides/slide14.xml><?xml version="1.0" encoding="utf-8"?>
 <p:sld xmlns:a="http://schemas.openxmlformats.org/drawingml/2006/main" xmlns:r="http://schemas.openxmlformats.org/officeDocument/2006/relationships" xmlns:p="http://schemas.openxmlformats.org/presentationml/2006/main">
   <p:cSld>
     <p:spTree>
@@ -21321,7 +21748,475 @@
 </p:sld>
 </file>
 
-<file path=ppt/slides/slide14.xml><?xml version="1.0" encoding="utf-8"?>
+<file path=ppt/slides/slide15.xml><?xml version="1.0" encoding="utf-8"?>
+<p:sld xmlns:a="http://schemas.openxmlformats.org/drawingml/2006/main" xmlns:r="http://schemas.openxmlformats.org/officeDocument/2006/relationships" xmlns:p="http://schemas.openxmlformats.org/presentationml/2006/main">
+  <p:cSld>
+    <p:spTree>
+      <p:nvGrpSpPr>
+        <p:cNvPr id="1" name=""/>
+        <p:cNvGrpSpPr/>
+        <p:nvPr/>
+      </p:nvGrpSpPr>
+      <p:grpSpPr>
+        <a:xfrm>
+          <a:off x="0" y="0"/>
+          <a:ext cx="0" cy="0"/>
+          <a:chOff x="0" y="0"/>
+          <a:chExt cx="0" cy="0"/>
+        </a:xfrm>
+      </p:grpSpPr>
+      <p:sp>
+        <p:nvSpPr>
+          <p:cNvPr id="2" name="Title 1">
+            <a:extLst>
+              <a:ext uri="{FF2B5EF4-FFF2-40B4-BE49-F238E27FC236}">
+                <a16:creationId xmlns:a16="http://schemas.microsoft.com/office/drawing/2014/main" id="{2703F434-82F5-5F8F-D336-58F5544EC320}"/>
+              </a:ext>
+            </a:extLst>
+          </p:cNvPr>
+          <p:cNvSpPr>
+            <a:spLocks noGrp="1"/>
+          </p:cNvSpPr>
+          <p:nvPr>
+            <p:ph type="title"/>
+          </p:nvPr>
+        </p:nvSpPr>
+        <p:spPr/>
+        <p:txBody>
+          <a:bodyPr/>
+          <a:lstStyle/>
+          <a:p>
+            <a:r>
+              <a:rPr lang="en-US" dirty="0"/>
+              <a:t>More Useful Array Examples</a:t>
+            </a:r>
+          </a:p>
+        </p:txBody>
+      </p:sp>
+      <p:sp>
+        <p:nvSpPr>
+          <p:cNvPr id="3" name="Text Placeholder 2">
+            <a:extLst>
+              <a:ext uri="{FF2B5EF4-FFF2-40B4-BE49-F238E27FC236}">
+                <a16:creationId xmlns:a16="http://schemas.microsoft.com/office/drawing/2014/main" id="{6AC01FB3-1A96-8894-EE50-495F85E8D96D}"/>
+              </a:ext>
+            </a:extLst>
+          </p:cNvPr>
+          <p:cNvSpPr>
+            <a:spLocks noGrp="1"/>
+          </p:cNvSpPr>
+          <p:nvPr>
+            <p:ph type="body" idx="1"/>
+          </p:nvPr>
+        </p:nvSpPr>
+        <p:spPr/>
+        <p:txBody>
+          <a:bodyPr/>
+          <a:lstStyle/>
+          <a:p>
+            <a:pPr marL="88900" indent="0">
+              <a:buNone/>
+            </a:pPr>
+            <a:r>
+              <a:rPr lang="en-US" dirty="0">
+                <a:latin typeface="Intel One Mono" panose="020B0509020203020204" pitchFamily="49" charset="0"/>
+              </a:rPr>
+              <a:t>let a = [1,2,3,4,5];</a:t>
+            </a:r>
+          </a:p>
+          <a:p>
+            <a:pPr marL="88900" indent="0">
+              <a:buNone/>
+            </a:pPr>
+            <a:r>
+              <a:rPr lang="en-US" b="1" dirty="0">
+                <a:latin typeface="Intel One Mono" panose="020B0509020203020204" pitchFamily="49" charset="0"/>
+              </a:rPr>
+              <a:t>ex. 1</a:t>
+            </a:r>
+          </a:p>
+          <a:p>
+            <a:pPr marL="88900" indent="0">
+              <a:buNone/>
+            </a:pPr>
+            <a:r>
+              <a:rPr lang="en-US" dirty="0">
+                <a:latin typeface="Intel One Mono" panose="020B0509020203020204" pitchFamily="49" charset="0"/>
+              </a:rPr>
+              <a:t>function f1(num) { num = 2; }</a:t>
+            </a:r>
+          </a:p>
+          <a:p>
+            <a:pPr marL="88900" indent="0">
+              <a:buNone/>
+            </a:pPr>
+            <a:r>
+              <a:rPr lang="en-US" dirty="0">
+                <a:latin typeface="Intel One Mono" panose="020B0509020203020204" pitchFamily="49" charset="0"/>
+              </a:rPr>
+              <a:t>f1(a[2]);</a:t>
+            </a:r>
+          </a:p>
+          <a:p>
+            <a:pPr marL="88900" indent="0">
+              <a:buNone/>
+            </a:pPr>
+            <a:r>
+              <a:rPr lang="en-US" dirty="0">
+                <a:latin typeface="Intel One Mono" panose="020B0509020203020204" pitchFamily="49" charset="0"/>
+              </a:rPr>
+              <a:t>console.log(a); // [1,2,3,4,5];</a:t>
+            </a:r>
+          </a:p>
+          <a:p>
+            <a:pPr marL="88900" indent="0">
+              <a:buNone/>
+            </a:pPr>
+            <a:endParaRPr lang="en-US" dirty="0">
+              <a:latin typeface="Intel One Mono" panose="020B0509020203020204" pitchFamily="49" charset="0"/>
+            </a:endParaRPr>
+          </a:p>
+          <a:p>
+            <a:pPr marL="88900" indent="0">
+              <a:buNone/>
+            </a:pPr>
+            <a:r>
+              <a:rPr lang="en-US" b="1" dirty="0">
+                <a:latin typeface="Intel One Mono" panose="020B0509020203020204" pitchFamily="49" charset="0"/>
+              </a:rPr>
+              <a:t>ex. 2</a:t>
+            </a:r>
+          </a:p>
+          <a:p>
+            <a:pPr marL="88900" indent="0">
+              <a:buNone/>
+            </a:pPr>
+            <a:r>
+              <a:rPr lang="en-US" dirty="0">
+                <a:latin typeface="Intel One Mono" panose="020B0509020203020204" pitchFamily="49" charset="0"/>
+              </a:rPr>
+              <a:t>function f2(</a:t>
+            </a:r>
+            <a:r>
+              <a:rPr lang="en-US" dirty="0" err="1">
+                <a:latin typeface="Intel One Mono" panose="020B0509020203020204" pitchFamily="49" charset="0"/>
+              </a:rPr>
+              <a:t>arr</a:t>
+            </a:r>
+            <a:r>
+              <a:rPr lang="en-US" dirty="0">
+                <a:latin typeface="Intel One Mono" panose="020B0509020203020204" pitchFamily="49" charset="0"/>
+              </a:rPr>
+              <a:t>) { </a:t>
+            </a:r>
+            <a:r>
+              <a:rPr lang="en-US" dirty="0" err="1">
+                <a:latin typeface="Intel One Mono" panose="020B0509020203020204" pitchFamily="49" charset="0"/>
+              </a:rPr>
+              <a:t>arr</a:t>
+            </a:r>
+            <a:r>
+              <a:rPr lang="en-US" dirty="0">
+                <a:latin typeface="Intel One Mono" panose="020B0509020203020204" pitchFamily="49" charset="0"/>
+              </a:rPr>
+              <a:t>[1] = 6; }</a:t>
+            </a:r>
+          </a:p>
+          <a:p>
+            <a:pPr marL="88900" indent="0">
+              <a:buNone/>
+            </a:pPr>
+            <a:r>
+              <a:rPr lang="en-US" dirty="0">
+                <a:latin typeface="Intel One Mono" panose="020B0509020203020204" pitchFamily="49" charset="0"/>
+              </a:rPr>
+              <a:t>f2(a);</a:t>
+            </a:r>
+          </a:p>
+          <a:p>
+            <a:pPr marL="88900" indent="0">
+              <a:buNone/>
+            </a:pPr>
+            <a:r>
+              <a:rPr lang="en-US" dirty="0">
+                <a:latin typeface="Intel One Mono" panose="020B0509020203020204" pitchFamily="49" charset="0"/>
+              </a:rPr>
+              <a:t>console.log(a); // [1,6,3,4,5];</a:t>
+            </a:r>
+          </a:p>
+          <a:p>
+            <a:pPr marL="88900" indent="0">
+              <a:buNone/>
+            </a:pPr>
+            <a:endParaRPr lang="en-US" b="1" dirty="0">
+              <a:latin typeface="Intel One Mono" panose="020B0509020203020204" pitchFamily="49" charset="0"/>
+            </a:endParaRPr>
+          </a:p>
+        </p:txBody>
+      </p:sp>
+    </p:spTree>
+    <p:extLst>
+      <p:ext uri="{BB962C8B-B14F-4D97-AF65-F5344CB8AC3E}">
+        <p14:creationId xmlns:p14="http://schemas.microsoft.com/office/powerpoint/2010/main" val="2670788996"/>
+      </p:ext>
+    </p:extLst>
+  </p:cSld>
+  <p:clrMapOvr>
+    <a:masterClrMapping/>
+  </p:clrMapOvr>
+</p:sld>
+</file>
+
+<file path=ppt/slides/slide16.xml><?xml version="1.0" encoding="utf-8"?>
+<p:sld xmlns:a="http://schemas.openxmlformats.org/drawingml/2006/main" xmlns:r="http://schemas.openxmlformats.org/officeDocument/2006/relationships" xmlns:p="http://schemas.openxmlformats.org/presentationml/2006/main">
+  <p:cSld>
+    <p:spTree>
+      <p:nvGrpSpPr>
+        <p:cNvPr id="1" name="">
+          <a:extLst>
+            <a:ext uri="{FF2B5EF4-FFF2-40B4-BE49-F238E27FC236}">
+              <a16:creationId xmlns:a16="http://schemas.microsoft.com/office/drawing/2014/main" id="{353DB4B0-6014-080B-012E-50BCB796EC95}"/>
+            </a:ext>
+          </a:extLst>
+        </p:cNvPr>
+        <p:cNvGrpSpPr/>
+        <p:nvPr/>
+      </p:nvGrpSpPr>
+      <p:grpSpPr>
+        <a:xfrm>
+          <a:off x="0" y="0"/>
+          <a:ext cx="0" cy="0"/>
+          <a:chOff x="0" y="0"/>
+          <a:chExt cx="0" cy="0"/>
+        </a:xfrm>
+      </p:grpSpPr>
+      <p:sp>
+        <p:nvSpPr>
+          <p:cNvPr id="2" name="Title 1">
+            <a:extLst>
+              <a:ext uri="{FF2B5EF4-FFF2-40B4-BE49-F238E27FC236}">
+                <a16:creationId xmlns:a16="http://schemas.microsoft.com/office/drawing/2014/main" id="{925EF8F3-BD20-99F2-B60D-B16EBEB37F37}"/>
+              </a:ext>
+            </a:extLst>
+          </p:cNvPr>
+          <p:cNvSpPr>
+            <a:spLocks noGrp="1"/>
+          </p:cNvSpPr>
+          <p:nvPr>
+            <p:ph type="title"/>
+          </p:nvPr>
+        </p:nvSpPr>
+        <p:spPr/>
+        <p:txBody>
+          <a:bodyPr/>
+          <a:lstStyle/>
+          <a:p>
+            <a:r>
+              <a:rPr lang="en-US" dirty="0"/>
+              <a:t>More Useful Object Examples</a:t>
+            </a:r>
+          </a:p>
+        </p:txBody>
+      </p:sp>
+      <p:sp>
+        <p:nvSpPr>
+          <p:cNvPr id="3" name="Text Placeholder 2">
+            <a:extLst>
+              <a:ext uri="{FF2B5EF4-FFF2-40B4-BE49-F238E27FC236}">
+                <a16:creationId xmlns:a16="http://schemas.microsoft.com/office/drawing/2014/main" id="{1B3BFCE5-DC6E-B099-D74C-FA3A395F932C}"/>
+              </a:ext>
+            </a:extLst>
+          </p:cNvPr>
+          <p:cNvSpPr>
+            <a:spLocks noGrp="1"/>
+          </p:cNvSpPr>
+          <p:nvPr>
+            <p:ph type="body" idx="1"/>
+          </p:nvPr>
+        </p:nvSpPr>
+        <p:spPr/>
+        <p:txBody>
+          <a:bodyPr/>
+          <a:lstStyle/>
+          <a:p>
+            <a:pPr marL="88900" indent="0">
+              <a:buNone/>
+            </a:pPr>
+            <a:r>
+              <a:rPr lang="en-US" dirty="0">
+                <a:latin typeface="Intel One Mono" panose="020B0509020203020204" pitchFamily="49" charset="0"/>
+              </a:rPr>
+              <a:t>let o = { e: “</a:t>
+            </a:r>
+            <a:r>
+              <a:rPr lang="en-US" dirty="0" err="1">
+                <a:latin typeface="Intel One Mono" panose="020B0509020203020204" pitchFamily="49" charset="0"/>
+              </a:rPr>
+              <a:t>yo</a:t>
+            </a:r>
+            <a:r>
+              <a:rPr lang="en-US" dirty="0">
+                <a:latin typeface="Intel One Mono" panose="020B0509020203020204" pitchFamily="49" charset="0"/>
+              </a:rPr>
+              <a:t>”, f: “ye” };</a:t>
+            </a:r>
+          </a:p>
+          <a:p>
+            <a:pPr marL="88900" indent="0">
+              <a:buNone/>
+            </a:pPr>
+            <a:r>
+              <a:rPr lang="en-US" b="1" dirty="0">
+                <a:latin typeface="Intel One Mono" panose="020B0509020203020204" pitchFamily="49" charset="0"/>
+              </a:rPr>
+              <a:t>ex. 1</a:t>
+            </a:r>
+          </a:p>
+          <a:p>
+            <a:pPr marL="88900" indent="0">
+              <a:buNone/>
+            </a:pPr>
+            <a:r>
+              <a:rPr lang="en-US" dirty="0">
+                <a:latin typeface="Intel One Mono" panose="020B0509020203020204" pitchFamily="49" charset="0"/>
+              </a:rPr>
+              <a:t>function f1(str) { str = “test”; }</a:t>
+            </a:r>
+          </a:p>
+          <a:p>
+            <a:pPr marL="88900" indent="0">
+              <a:buNone/>
+            </a:pPr>
+            <a:r>
+              <a:rPr lang="en-US" dirty="0">
+                <a:latin typeface="Intel One Mono" panose="020B0509020203020204" pitchFamily="49" charset="0"/>
+              </a:rPr>
+              <a:t>f1(</a:t>
+            </a:r>
+            <a:r>
+              <a:rPr lang="en-US" dirty="0" err="1">
+                <a:latin typeface="Intel One Mono" panose="020B0509020203020204" pitchFamily="49" charset="0"/>
+              </a:rPr>
+              <a:t>o.e</a:t>
+            </a:r>
+            <a:r>
+              <a:rPr lang="en-US" dirty="0">
+                <a:latin typeface="Intel One Mono" panose="020B0509020203020204" pitchFamily="49" charset="0"/>
+              </a:rPr>
+              <a:t>);</a:t>
+            </a:r>
+          </a:p>
+          <a:p>
+            <a:pPr marL="88900" indent="0">
+              <a:buNone/>
+            </a:pPr>
+            <a:r>
+              <a:rPr lang="en-US" dirty="0">
+                <a:latin typeface="Intel One Mono" panose="020B0509020203020204" pitchFamily="49" charset="0"/>
+              </a:rPr>
+              <a:t>console.log(o); // { e: “</a:t>
+            </a:r>
+            <a:r>
+              <a:rPr lang="en-US" dirty="0" err="1">
+                <a:latin typeface="Intel One Mono" panose="020B0509020203020204" pitchFamily="49" charset="0"/>
+              </a:rPr>
+              <a:t>yo</a:t>
+            </a:r>
+            <a:r>
+              <a:rPr lang="en-US" dirty="0">
+                <a:latin typeface="Intel One Mono" panose="020B0509020203020204" pitchFamily="49" charset="0"/>
+              </a:rPr>
+              <a:t>”, f: “ye” };</a:t>
+            </a:r>
+          </a:p>
+          <a:p>
+            <a:pPr marL="88900" indent="0">
+              <a:buNone/>
+            </a:pPr>
+            <a:endParaRPr lang="en-US" dirty="0">
+              <a:latin typeface="Intel One Mono" panose="020B0509020203020204" pitchFamily="49" charset="0"/>
+            </a:endParaRPr>
+          </a:p>
+          <a:p>
+            <a:pPr marL="88900" indent="0">
+              <a:buNone/>
+            </a:pPr>
+            <a:r>
+              <a:rPr lang="en-US" b="1" dirty="0">
+                <a:latin typeface="Intel One Mono" panose="020B0509020203020204" pitchFamily="49" charset="0"/>
+              </a:rPr>
+              <a:t>ex.2 </a:t>
+            </a:r>
+          </a:p>
+          <a:p>
+            <a:pPr marL="88900" indent="0">
+              <a:buNone/>
+            </a:pPr>
+            <a:r>
+              <a:rPr lang="en-US" dirty="0">
+                <a:latin typeface="Intel One Mono" panose="020B0509020203020204" pitchFamily="49" charset="0"/>
+              </a:rPr>
+              <a:t>function f2(obj) { </a:t>
+            </a:r>
+            <a:r>
+              <a:rPr lang="en-US" dirty="0" err="1">
+                <a:latin typeface="Intel One Mono" panose="020B0509020203020204" pitchFamily="49" charset="0"/>
+              </a:rPr>
+              <a:t>obj.e</a:t>
+            </a:r>
+            <a:r>
+              <a:rPr lang="en-US" dirty="0">
+                <a:latin typeface="Intel One Mono" panose="020B0509020203020204" pitchFamily="49" charset="0"/>
+              </a:rPr>
+              <a:t> = “test”; }</a:t>
+            </a:r>
+          </a:p>
+          <a:p>
+            <a:pPr marL="88900" indent="0">
+              <a:buNone/>
+            </a:pPr>
+            <a:r>
+              <a:rPr lang="en-US" dirty="0">
+                <a:latin typeface="Intel One Mono" panose="020B0509020203020204" pitchFamily="49" charset="0"/>
+              </a:rPr>
+              <a:t>f2(o);</a:t>
+            </a:r>
+          </a:p>
+          <a:p>
+            <a:pPr marL="88900" indent="0">
+              <a:buNone/>
+            </a:pPr>
+            <a:r>
+              <a:rPr lang="en-US" dirty="0">
+                <a:latin typeface="Intel One Mono" panose="020B0509020203020204" pitchFamily="49" charset="0"/>
+              </a:rPr>
+              <a:t>console.log(o); // { e: “test”, f: “ye” };</a:t>
+            </a:r>
+          </a:p>
+          <a:p>
+            <a:pPr marL="88900" indent="0">
+              <a:buNone/>
+            </a:pPr>
+            <a:endParaRPr lang="en-US" dirty="0">
+              <a:latin typeface="Intel One Mono" panose="020B0509020203020204" pitchFamily="49" charset="0"/>
+            </a:endParaRPr>
+          </a:p>
+        </p:txBody>
+      </p:sp>
+    </p:spTree>
+    <p:extLst>
+      <p:ext uri="{BB962C8B-B14F-4D97-AF65-F5344CB8AC3E}">
+        <p14:creationId xmlns:p14="http://schemas.microsoft.com/office/powerpoint/2010/main" val="1284197198"/>
+      </p:ext>
+    </p:extLst>
+  </p:cSld>
+  <p:clrMapOvr>
+    <a:masterClrMapping/>
+  </p:clrMapOvr>
+</p:sld>
+</file>
+
+<file path=ppt/slides/slide17.xml><?xml version="1.0" encoding="utf-8"?>
 <p:sld xmlns:a="http://schemas.openxmlformats.org/drawingml/2006/main" xmlns:r="http://schemas.openxmlformats.org/officeDocument/2006/relationships" xmlns:p="http://schemas.openxmlformats.org/presentationml/2006/main">
   <p:cSld>
     <p:spTree>
@@ -21676,7 +22571,7 @@
 </p:sld>
 </file>
 
-<file path=ppt/slides/slide15.xml><?xml version="1.0" encoding="utf-8"?>
+<file path=ppt/slides/slide18.xml><?xml version="1.0" encoding="utf-8"?>
 <p:sld xmlns:a="http://schemas.openxmlformats.org/drawingml/2006/main" xmlns:r="http://schemas.openxmlformats.org/officeDocument/2006/relationships" xmlns:p="http://schemas.openxmlformats.org/presentationml/2006/main">
   <p:cSld>
     <p:spTree>
@@ -22010,9 +22905,8 @@
             </a:pPr>
             <a:r>
               <a:rPr lang="en-US" dirty="0"/>
-              <a:t>Variable Storage in JS</a:t>
+              <a:t>Variable Types in JS</a:t>
             </a:r>
-            <a:endParaRPr dirty="0"/>
           </a:p>
         </p:txBody>
       </p:sp>
@@ -22052,26 +22946,22 @@
             </a:pPr>
             <a:r>
               <a:rPr lang="en-US" dirty="0"/>
-              <a:t>Two ways variables are stored in programming languages</a:t>
+              <a:t>There are 2 major categories of variables in JS</a:t>
             </a:r>
           </a:p>
           <a:p>
             <a:pPr marL="342900" indent="-342900"/>
             <a:r>
               <a:rPr lang="en-US" dirty="0"/>
-              <a:t>Primitive (simple types) – variable being used is storing the actual value</a:t>
+              <a:t>Primitive Types</a:t>
             </a:r>
           </a:p>
           <a:p>
             <a:pPr marL="342900" indent="-342900"/>
             <a:r>
               <a:rPr lang="en-US" dirty="0"/>
-              <a:t>Reference (complex types) – variable being used is storing an address in memory to the value</a:t>
+              <a:t>Complex Types</a:t>
             </a:r>
-          </a:p>
-          <a:p>
-            <a:pPr marL="342900" indent="-342900"/>
-            <a:endParaRPr dirty="0"/>
           </a:p>
         </p:txBody>
       </p:sp>
@@ -22178,7 +23068,7 @@
             </a:pPr>
             <a:r>
               <a:rPr lang="en-US" dirty="0"/>
-              <a:t>Primitive types are simple values. When you assign these types to a variable, the value is directly stored in a fixed location in memory.</a:t>
+              <a:t>Primitive types are simple values. When you assign these types to a variable, they are stored on the stack in a fixed location in memory.</a:t>
             </a:r>
           </a:p>
           <a:p>
@@ -22322,7 +23212,7 @@
             </a:pPr>
             <a:r>
               <a:rPr lang="en-US" dirty="0"/>
-              <a:t>Complex types are exactly that, more complex. When you create an object, it is created in the heap. Assigning a complex object to a variable is storing an address in memory, not the object itself.</a:t>
+              <a:t>Complex types are exactly that, more complex. When you create a complex type, it is created in the heap. Assigning a complex type to a variable is creating a primitive type variable storing an address to that space of memory, not the type itself.</a:t>
             </a:r>
           </a:p>
           <a:p>
@@ -22357,6 +23247,119 @@
 </file>
 
 <file path=ppt/slides/slide5.xml><?xml version="1.0" encoding="utf-8"?>
+<p:sld xmlns:a="http://schemas.openxmlformats.org/drawingml/2006/main" xmlns:r="http://schemas.openxmlformats.org/officeDocument/2006/relationships" xmlns:p="http://schemas.openxmlformats.org/presentationml/2006/main">
+  <p:cSld>
+    <p:spTree>
+      <p:nvGrpSpPr>
+        <p:cNvPr id="1" name=""/>
+        <p:cNvGrpSpPr/>
+        <p:nvPr/>
+      </p:nvGrpSpPr>
+      <p:grpSpPr>
+        <a:xfrm>
+          <a:off x="0" y="0"/>
+          <a:ext cx="0" cy="0"/>
+          <a:chOff x="0" y="0"/>
+          <a:chExt cx="0" cy="0"/>
+        </a:xfrm>
+      </p:grpSpPr>
+      <p:sp>
+        <p:nvSpPr>
+          <p:cNvPr id="2" name="Title 1">
+            <a:extLst>
+              <a:ext uri="{FF2B5EF4-FFF2-40B4-BE49-F238E27FC236}">
+                <a16:creationId xmlns:a16="http://schemas.microsoft.com/office/drawing/2014/main" id="{68B906EB-95D1-CEC1-065D-BAD41EC40C59}"/>
+              </a:ext>
+            </a:extLst>
+          </p:cNvPr>
+          <p:cNvSpPr>
+            <a:spLocks noGrp="1"/>
+          </p:cNvSpPr>
+          <p:nvPr>
+            <p:ph type="title"/>
+          </p:nvPr>
+        </p:nvSpPr>
+        <p:spPr/>
+        <p:txBody>
+          <a:bodyPr/>
+          <a:lstStyle/>
+          <a:p>
+            <a:r>
+              <a:rPr lang="en-US" dirty="0"/>
+              <a:t>Variable Referencing</a:t>
+            </a:r>
+          </a:p>
+        </p:txBody>
+      </p:sp>
+      <p:sp>
+        <p:nvSpPr>
+          <p:cNvPr id="3" name="Text Placeholder 2">
+            <a:extLst>
+              <a:ext uri="{FF2B5EF4-FFF2-40B4-BE49-F238E27FC236}">
+                <a16:creationId xmlns:a16="http://schemas.microsoft.com/office/drawing/2014/main" id="{07DC0009-2651-29DC-FDB6-3822CD7E2713}"/>
+              </a:ext>
+            </a:extLst>
+          </p:cNvPr>
+          <p:cNvSpPr>
+            <a:spLocks noGrp="1"/>
+          </p:cNvSpPr>
+          <p:nvPr>
+            <p:ph type="body" idx="1"/>
+          </p:nvPr>
+        </p:nvSpPr>
+        <p:spPr/>
+        <p:txBody>
+          <a:bodyPr/>
+          <a:lstStyle/>
+          <a:p>
+            <a:pPr marL="88900" indent="0">
+              <a:buNone/>
+            </a:pPr>
+            <a:r>
+              <a:rPr lang="en-US" dirty="0"/>
+              <a:t>Variables are passed around and referenced in 2 ways</a:t>
+            </a:r>
+          </a:p>
+          <a:p>
+            <a:pPr marL="342900" indent="-342900"/>
+            <a:r>
+              <a:rPr lang="en-US" dirty="0"/>
+              <a:t>By Value (simple types) – the value of variable being used is passed around and used</a:t>
+            </a:r>
+          </a:p>
+          <a:p>
+            <a:pPr marL="342900" indent="-342900"/>
+            <a:r>
+              <a:rPr lang="en-US" dirty="0"/>
+              <a:t>By Reference (complex types) – the address in memory of the variable being used is passed around</a:t>
+            </a:r>
+          </a:p>
+          <a:p>
+            <a:pPr marL="342900" indent="-342900"/>
+            <a:endParaRPr lang="en-US" dirty="0"/>
+          </a:p>
+          <a:p>
+            <a:pPr marL="88900" indent="0">
+              <a:buNone/>
+            </a:pPr>
+            <a:endParaRPr lang="en-US" dirty="0"/>
+          </a:p>
+        </p:txBody>
+      </p:sp>
+    </p:spTree>
+    <p:extLst>
+      <p:ext uri="{BB962C8B-B14F-4D97-AF65-F5344CB8AC3E}">
+        <p14:creationId xmlns:p14="http://schemas.microsoft.com/office/powerpoint/2010/main" val="1259896454"/>
+      </p:ext>
+    </p:extLst>
+  </p:cSld>
+  <p:clrMapOvr>
+    <a:masterClrMapping/>
+  </p:clrMapOvr>
+</p:sld>
+</file>
+
+<file path=ppt/slides/slide6.xml><?xml version="1.0" encoding="utf-8"?>
 <p:sld xmlns:a="http://schemas.openxmlformats.org/drawingml/2006/main" xmlns:r="http://schemas.openxmlformats.org/officeDocument/2006/relationships" xmlns:p="http://schemas.openxmlformats.org/presentationml/2006/main">
   <p:cSld>
     <p:spTree>
@@ -22467,7 +23470,7 @@
 </p:sld>
 </file>
 
-<file path=ppt/slides/slide6.xml><?xml version="1.0" encoding="utf-8"?>
+<file path=ppt/slides/slide7.xml><?xml version="1.0" encoding="utf-8"?>
 <p:sld xmlns:a="http://schemas.openxmlformats.org/drawingml/2006/main" xmlns:r="http://schemas.openxmlformats.org/officeDocument/2006/relationships" xmlns:p="http://schemas.openxmlformats.org/presentationml/2006/main">
   <p:cSld>
     <p:spTree>
@@ -22575,7 +23578,7 @@
 </p:sld>
 </file>
 
-<file path=ppt/slides/slide7.xml><?xml version="1.0" encoding="utf-8"?>
+<file path=ppt/slides/slide8.xml><?xml version="1.0" encoding="utf-8"?>
 <p:sld xmlns:a="http://schemas.openxmlformats.org/drawingml/2006/main" xmlns:r="http://schemas.openxmlformats.org/officeDocument/2006/relationships" xmlns:p="http://schemas.openxmlformats.org/presentationml/2006/main">
   <p:cSld>
     <p:spTree>
@@ -22644,14 +23647,14 @@
             <a:pPr marL="342900" indent="-342900"/>
             <a:r>
               <a:rPr lang="en-US" dirty="0"/>
-              <a:t>Stores complex objects </a:t>
+              <a:t>Stores complex types </a:t>
             </a:r>
           </a:p>
           <a:p>
             <a:pPr marL="342900" indent="-342900"/>
             <a:r>
               <a:rPr lang="en-US" dirty="0"/>
-              <a:t>Memory isn’t released until the stack contains no references to the object</a:t>
+              <a:t>Memory isn’t released until the stack contains no references to the type</a:t>
             </a:r>
           </a:p>
           <a:p>
@@ -22700,7 +23703,7 @@
 </p:sld>
 </file>
 
-<file path=ppt/slides/slide8.xml><?xml version="1.0" encoding="utf-8"?>
+<file path=ppt/slides/slide9.xml><?xml version="1.0" encoding="utf-8"?>
 <p:sld xmlns:a="http://schemas.openxmlformats.org/drawingml/2006/main" xmlns:r="http://schemas.openxmlformats.org/officeDocument/2006/relationships" xmlns:p="http://schemas.openxmlformats.org/presentationml/2006/main">
   <p:cSld>
     <p:spTree>
@@ -22923,193 +23926,6 @@
         </p:txBody>
       </p:sp>
     </p:spTree>
-  </p:cSld>
-  <p:clrMapOvr>
-    <a:masterClrMapping/>
-  </p:clrMapOvr>
-</p:sld>
-</file>
-
-<file path=ppt/slides/slide9.xml><?xml version="1.0" encoding="utf-8"?>
-<p:sld xmlns:a="http://schemas.openxmlformats.org/drawingml/2006/main" xmlns:r="http://schemas.openxmlformats.org/officeDocument/2006/relationships" xmlns:p="http://schemas.openxmlformats.org/presentationml/2006/main">
-  <p:cSld>
-    <p:spTree>
-      <p:nvGrpSpPr>
-        <p:cNvPr id="1" name=""/>
-        <p:cNvGrpSpPr/>
-        <p:nvPr/>
-      </p:nvGrpSpPr>
-      <p:grpSpPr>
-        <a:xfrm>
-          <a:off x="0" y="0"/>
-          <a:ext cx="0" cy="0"/>
-          <a:chOff x="0" y="0"/>
-          <a:chExt cx="0" cy="0"/>
-        </a:xfrm>
-      </p:grpSpPr>
-      <p:sp>
-        <p:nvSpPr>
-          <p:cNvPr id="2" name="Title 1">
-            <a:extLst>
-              <a:ext uri="{FF2B5EF4-FFF2-40B4-BE49-F238E27FC236}">
-                <a16:creationId xmlns:a16="http://schemas.microsoft.com/office/drawing/2014/main" id="{0A4DCE4A-58C2-4130-C16B-67904DB39781}"/>
-              </a:ext>
-            </a:extLst>
-          </p:cNvPr>
-          <p:cNvSpPr>
-            <a:spLocks noGrp="1"/>
-          </p:cNvSpPr>
-          <p:nvPr>
-            <p:ph type="title"/>
-          </p:nvPr>
-        </p:nvSpPr>
-        <p:spPr/>
-        <p:txBody>
-          <a:bodyPr/>
-          <a:lstStyle/>
-          <a:p>
-            <a:r>
-              <a:rPr lang="en-US" dirty="0"/>
-              <a:t>Mutations of Complex Values</a:t>
-            </a:r>
-          </a:p>
-        </p:txBody>
-      </p:sp>
-      <p:sp>
-        <p:nvSpPr>
-          <p:cNvPr id="3" name="Text Placeholder 2">
-            <a:extLst>
-              <a:ext uri="{FF2B5EF4-FFF2-40B4-BE49-F238E27FC236}">
-                <a16:creationId xmlns:a16="http://schemas.microsoft.com/office/drawing/2014/main" id="{1C9F195E-E8D2-E258-5DE8-29E7D708BF9E}"/>
-              </a:ext>
-            </a:extLst>
-          </p:cNvPr>
-          <p:cNvSpPr>
-            <a:spLocks noGrp="1"/>
-          </p:cNvSpPr>
-          <p:nvPr>
-            <p:ph type="body" idx="1"/>
-          </p:nvPr>
-        </p:nvSpPr>
-        <p:spPr/>
-        <p:txBody>
-          <a:bodyPr/>
-          <a:lstStyle/>
-          <a:p>
-            <a:pPr marL="88900" indent="0">
-              <a:buNone/>
-            </a:pPr>
-            <a:r>
-              <a:rPr lang="en-US" dirty="0">
-                <a:latin typeface="Intel One Mono" panose="020B0509020203020204" pitchFamily="49" charset="0"/>
-              </a:rPr>
-              <a:t>let o1 = { language: “JavaScript" };</a:t>
-            </a:r>
-          </a:p>
-          <a:p>
-            <a:pPr marL="88900" indent="0">
-              <a:buNone/>
-            </a:pPr>
-            <a:r>
-              <a:rPr lang="en-US" dirty="0">
-                <a:latin typeface="Intel One Mono" panose="020B0509020203020204" pitchFamily="49" charset="0"/>
-              </a:rPr>
-              <a:t>let o2 = o1;</a:t>
-            </a:r>
-          </a:p>
-          <a:p>
-            <a:pPr marL="88900" indent="0">
-              <a:buNone/>
-            </a:pPr>
-            <a:r>
-              <a:rPr lang="en-US" dirty="0">
-                <a:latin typeface="Intel One Mono" panose="020B0509020203020204" pitchFamily="49" charset="0"/>
-              </a:rPr>
-              <a:t>o2.language = “</a:t>
-            </a:r>
-            <a:r>
-              <a:rPr lang="en-US" dirty="0" err="1">
-                <a:latin typeface="Intel One Mono" panose="020B0509020203020204" pitchFamily="49" charset="0"/>
-              </a:rPr>
-              <a:t>GoLang</a:t>
-            </a:r>
-            <a:r>
-              <a:rPr lang="en-US" dirty="0">
-                <a:latin typeface="Intel One Mono" panose="020B0509020203020204" pitchFamily="49" charset="0"/>
-              </a:rPr>
-              <a:t>";</a:t>
-            </a:r>
-          </a:p>
-          <a:p>
-            <a:pPr marL="88900" indent="0">
-              <a:buNone/>
-            </a:pPr>
-            <a:endParaRPr lang="en-US" dirty="0">
-              <a:latin typeface="Intel One Mono" panose="020B0509020203020204" pitchFamily="49" charset="0"/>
-            </a:endParaRPr>
-          </a:p>
-          <a:p>
-            <a:pPr marL="88900" indent="0">
-              <a:buNone/>
-            </a:pPr>
-            <a:r>
-              <a:rPr lang="en-US" dirty="0">
-                <a:latin typeface="Intel One Mono" panose="020B0509020203020204" pitchFamily="49" charset="0"/>
-              </a:rPr>
-              <a:t>console.log(o1.language); // "</a:t>
-            </a:r>
-            <a:r>
-              <a:rPr lang="en-US" dirty="0" err="1">
-                <a:latin typeface="Intel One Mono" panose="020B0509020203020204" pitchFamily="49" charset="0"/>
-              </a:rPr>
-              <a:t>GoLang</a:t>
-            </a:r>
-            <a:r>
-              <a:rPr lang="en-US" dirty="0">
-                <a:latin typeface="Intel One Mono" panose="020B0509020203020204" pitchFamily="49" charset="0"/>
-              </a:rPr>
-              <a:t>"</a:t>
-            </a:r>
-          </a:p>
-          <a:p>
-            <a:pPr marL="88900" indent="0">
-              <a:buNone/>
-            </a:pPr>
-            <a:r>
-              <a:rPr lang="en-US" dirty="0">
-                <a:latin typeface="Intel One Mono" panose="020B0509020203020204" pitchFamily="49" charset="0"/>
-              </a:rPr>
-              <a:t>console.log(o2.language); // "</a:t>
-            </a:r>
-            <a:r>
-              <a:rPr lang="en-US" dirty="0" err="1">
-                <a:latin typeface="Intel One Mono" panose="020B0509020203020204" pitchFamily="49" charset="0"/>
-              </a:rPr>
-              <a:t>GoLang</a:t>
-            </a:r>
-            <a:r>
-              <a:rPr lang="en-US" dirty="0">
-                <a:latin typeface="Intel One Mono" panose="020B0509020203020204" pitchFamily="49" charset="0"/>
-              </a:rPr>
-              <a:t>"</a:t>
-            </a:r>
-          </a:p>
-          <a:p>
-            <a:pPr marL="88900" indent="0">
-              <a:buNone/>
-            </a:pPr>
-            <a:endParaRPr lang="en-US" dirty="0">
-              <a:latin typeface="Intel One Mono" panose="020B0509020203020204" pitchFamily="49" charset="0"/>
-            </a:endParaRPr>
-          </a:p>
-        </p:txBody>
-      </p:sp>
-    </p:spTree>
-    <p:extLst>
-      <p:ext uri="{BB962C8B-B14F-4D97-AF65-F5344CB8AC3E}">
-        <p14:creationId xmlns:p14="http://schemas.microsoft.com/office/powerpoint/2010/main" val="4107396059"/>
-      </p:ext>
-    </p:extLst>
   </p:cSld>
   <p:clrMapOvr>
     <a:masterClrMapping/>

</xml_diff>